<commit_message>
Observaciones 1 tema 6
</commit_message>
<xml_diff>
--- a/fuentes/contenidos/grado08/guion06/MA_08_06_REC280.pptx
+++ b/fuentes/contenidos/grado08/guion06/MA_08_06_REC280.pptx
@@ -450,7 +450,7 @@
           <a:p>
             <a:fld id="{5001C876-01F7-4317-94B9-1AE222133113}" type="datetimeFigureOut">
               <a:rPr lang="es-ES" smtClean="0"/>
-              <a:t>23/12/2015</a:t>
+              <a:t>15/01/2016</a:t>
             </a:fld>
             <a:endParaRPr lang="es-ES"/>
           </a:p>
@@ -1525,13 +1525,6 @@
               </a:rPr>
               <a:t> + b = c</a:t>
             </a:r>
-            <a:endParaRPr lang="es-CO" sz="900" i="1" dirty="0">
-              <a:solidFill>
-                <a:schemeClr val="tx1"/>
-              </a:solidFill>
-              <a:latin typeface="Arial" panose="020B0604020202020204" pitchFamily="34" charset="0"/>
-              <a:cs typeface="Arial" panose="020B0604020202020204" pitchFamily="34" charset="0"/>
-            </a:endParaRPr>
           </a:p>
         </p:txBody>
       </p:sp>
@@ -1751,13 +1744,6 @@
               </a:rPr>
               <a:t>cerrados</a:t>
             </a:r>
-            <a:endParaRPr lang="es-ES" sz="900" dirty="0" smtClean="0">
-              <a:solidFill>
-                <a:schemeClr val="tx1"/>
-              </a:solidFill>
-              <a:latin typeface="Arial" panose="020B0604020202020204" pitchFamily="34" charset="0"/>
-              <a:cs typeface="Arial" panose="020B0604020202020204" pitchFamily="34" charset="0"/>
-            </a:endParaRPr>
           </a:p>
           <a:p>
             <a:pPr algn="ctr"/>
@@ -1911,17 +1897,7 @@
                 <a:latin typeface="Arial" panose="020B0604020202020204" pitchFamily="34" charset="0"/>
                 <a:cs typeface="Arial" panose="020B0604020202020204" pitchFamily="34" charset="0"/>
               </a:rPr>
-              <a:t>abiertos</a:t>
-            </a:r>
-            <a:r>
-              <a:rPr lang="es-ES" sz="900" dirty="0" smtClean="0">
-                <a:solidFill>
-                  <a:schemeClr val="tx1"/>
-                </a:solidFill>
-                <a:latin typeface="Arial" panose="020B0604020202020204" pitchFamily="34" charset="0"/>
-                <a:cs typeface="Arial" panose="020B0604020202020204" pitchFamily="34" charset="0"/>
-              </a:rPr>
-              <a:t> </a:t>
+              <a:t>abiertos </a:t>
             </a:r>
           </a:p>
           <a:p>
@@ -1944,7 +1920,7 @@
                 <a:latin typeface="Arial" panose="020B0604020202020204" pitchFamily="34" charset="0"/>
                 <a:cs typeface="Arial" panose="020B0604020202020204" pitchFamily="34" charset="0"/>
               </a:rPr>
-              <a:t>a. b</a:t>
+              <a:t>a, b</a:t>
             </a:r>
             <a:r>
               <a:rPr lang="es-ES" sz="900" dirty="0" smtClean="0">
@@ -2411,10 +2387,6 @@
               </a:rPr>
               <a:t>+ 4 ≤ 3</a:t>
             </a:r>
-            <a:endParaRPr lang="es-CO" sz="900" dirty="0">
-              <a:latin typeface="Arial" panose="020B0604020202020204" pitchFamily="34" charset="0"/>
-              <a:cs typeface="Arial" panose="020B0604020202020204" pitchFamily="34" charset="0"/>
-            </a:endParaRPr>
           </a:p>
         </p:txBody>
       </p:sp>
@@ -2506,7 +2478,7 @@
         </p:nvSpPr>
         <p:spPr>
           <a:xfrm>
-            <a:off x="2607219" y="2805219"/>
+            <a:off x="2595180" y="2791808"/>
             <a:ext cx="1122431" cy="343441"/>
           </a:xfrm>
           <a:prstGeom prst="rect">
@@ -2573,8 +2545,8 @@
         </p:nvCxnSpPr>
         <p:spPr>
           <a:xfrm rot="16200000" flipH="1">
-            <a:off x="2754136" y="2390920"/>
-            <a:ext cx="202204" cy="626393"/>
+            <a:off x="2754823" y="2390234"/>
+            <a:ext cx="188793" cy="614354"/>
           </a:xfrm>
           <a:prstGeom prst="bentConnector3">
             <a:avLst>
@@ -2989,6 +2961,39 @@
               </a:rPr>
               <a:t>cerrados </a:t>
             </a:r>
+          </a:p>
+          <a:p>
+            <a:pPr algn="ctr"/>
+            <a:r>
+              <a:rPr lang="es-ES" sz="900" dirty="0" smtClean="0">
+                <a:solidFill>
+                  <a:schemeClr val="tx1"/>
+                </a:solidFill>
+                <a:latin typeface="Arial" panose="020B0604020202020204" pitchFamily="34" charset="0"/>
+                <a:cs typeface="Arial" panose="020B0604020202020204" pitchFamily="34" charset="0"/>
+              </a:rPr>
+              <a:t>(</a:t>
+            </a:r>
+            <a:r>
+              <a:rPr lang="es-ES" sz="900" i="1" dirty="0" smtClean="0">
+                <a:solidFill>
+                  <a:schemeClr val="tx1"/>
+                </a:solidFill>
+                <a:latin typeface="Arial" panose="020B0604020202020204" pitchFamily="34" charset="0"/>
+                <a:cs typeface="Arial" panose="020B0604020202020204" pitchFamily="34" charset="0"/>
+              </a:rPr>
+              <a:t>a, b</a:t>
+            </a:r>
+            <a:r>
+              <a:rPr lang="es-ES" sz="900" dirty="0">
+                <a:solidFill>
+                  <a:schemeClr val="tx1"/>
+                </a:solidFill>
+                <a:latin typeface="Arial" panose="020B0604020202020204" pitchFamily="34" charset="0"/>
+                <a:cs typeface="Arial" panose="020B0604020202020204" pitchFamily="34" charset="0"/>
+              </a:rPr>
+              <a:t>]</a:t>
+            </a:r>
             <a:endParaRPr lang="es-ES" sz="900" dirty="0" smtClean="0">
               <a:solidFill>
                 <a:schemeClr val="tx1"/>
@@ -3000,24 +3005,54 @@
           <a:p>
             <a:pPr algn="ctr"/>
             <a:r>
-              <a:rPr lang="es-ES" sz="900" dirty="0" smtClean="0">
+              <a:rPr lang="es-ES" sz="900" smtClean="0">
                 <a:solidFill>
                   <a:schemeClr val="tx1"/>
                 </a:solidFill>
                 <a:latin typeface="Arial" panose="020B0604020202020204" pitchFamily="34" charset="0"/>
                 <a:cs typeface="Arial" panose="020B0604020202020204" pitchFamily="34" charset="0"/>
               </a:rPr>
-              <a:t>(</a:t>
-            </a:r>
-            <a:r>
-              <a:rPr lang="es-ES" sz="900" i="1" dirty="0" smtClean="0">
+              <a:t>[</a:t>
+            </a:r>
+            <a:r>
+              <a:rPr lang="es-ES" sz="900" i="1" smtClean="0">
                 <a:solidFill>
                   <a:schemeClr val="tx1"/>
                 </a:solidFill>
                 <a:latin typeface="Arial" panose="020B0604020202020204" pitchFamily="34" charset="0"/>
                 <a:cs typeface="Arial" panose="020B0604020202020204" pitchFamily="34" charset="0"/>
               </a:rPr>
-              <a:t>a. b</a:t>
+              <a:t>a</a:t>
+            </a:r>
+            <a:r>
+              <a:rPr lang="es-ES" sz="900" i="1" dirty="0">
+                <a:solidFill>
+                  <a:schemeClr val="tx1"/>
+                </a:solidFill>
+                <a:latin typeface="Arial" panose="020B0604020202020204" pitchFamily="34" charset="0"/>
+                <a:cs typeface="Arial" panose="020B0604020202020204" pitchFamily="34" charset="0"/>
+              </a:rPr>
+              <a:t>,</a:t>
+            </a:r>
+            <a:r>
+              <a:rPr lang="es-ES" sz="900" i="1" smtClean="0">
+                <a:solidFill>
+                  <a:schemeClr val="tx1"/>
+                </a:solidFill>
+                <a:latin typeface="Arial" panose="020B0604020202020204" pitchFamily="34" charset="0"/>
+                <a:cs typeface="Arial" panose="020B0604020202020204" pitchFamily="34" charset="0"/>
+              </a:rPr>
+              <a:t> </a:t>
+            </a:r>
+            <a:r>
+              <a:rPr lang="es-ES" sz="900" i="1" dirty="0">
+                <a:solidFill>
+                  <a:schemeClr val="tx1"/>
+                </a:solidFill>
+                <a:latin typeface="Arial" panose="020B0604020202020204" pitchFamily="34" charset="0"/>
+                <a:cs typeface="Arial" panose="020B0604020202020204" pitchFamily="34" charset="0"/>
+              </a:rPr>
+              <a:t>b</a:t>
             </a:r>
             <a:r>
               <a:rPr lang="es-ES" sz="900" dirty="0">
@@ -3027,65 +3062,8 @@
                 <a:latin typeface="Arial" panose="020B0604020202020204" pitchFamily="34" charset="0"/>
                 <a:cs typeface="Arial" panose="020B0604020202020204" pitchFamily="34" charset="0"/>
               </a:rPr>
-              <a:t>]</a:t>
-            </a:r>
-            <a:endParaRPr lang="es-ES" sz="900" dirty="0" smtClean="0">
-              <a:solidFill>
-                <a:schemeClr val="tx1"/>
-              </a:solidFill>
-              <a:latin typeface="Arial" panose="020B0604020202020204" pitchFamily="34" charset="0"/>
-              <a:cs typeface="Arial" panose="020B0604020202020204" pitchFamily="34" charset="0"/>
-            </a:endParaRPr>
-          </a:p>
-          <a:p>
-            <a:pPr algn="ctr"/>
-            <a:r>
-              <a:rPr lang="es-ES" sz="900" dirty="0" smtClean="0">
-                <a:solidFill>
-                  <a:schemeClr val="tx1"/>
-                </a:solidFill>
-                <a:latin typeface="Arial" panose="020B0604020202020204" pitchFamily="34" charset="0"/>
-                <a:cs typeface="Arial" panose="020B0604020202020204" pitchFamily="34" charset="0"/>
-              </a:rPr>
-              <a:t>[</a:t>
-            </a:r>
-            <a:r>
-              <a:rPr lang="es-ES" sz="900" i="1" dirty="0" smtClean="0">
-                <a:solidFill>
-                  <a:schemeClr val="tx1"/>
-                </a:solidFill>
-                <a:latin typeface="Arial" panose="020B0604020202020204" pitchFamily="34" charset="0"/>
-                <a:cs typeface="Arial" panose="020B0604020202020204" pitchFamily="34" charset="0"/>
-              </a:rPr>
-              <a:t>a</a:t>
-            </a:r>
-            <a:r>
-              <a:rPr lang="es-ES" sz="900" i="1" dirty="0">
-                <a:solidFill>
-                  <a:schemeClr val="tx1"/>
-                </a:solidFill>
-                <a:latin typeface="Arial" panose="020B0604020202020204" pitchFamily="34" charset="0"/>
-                <a:cs typeface="Arial" panose="020B0604020202020204" pitchFamily="34" charset="0"/>
-              </a:rPr>
-              <a:t>. b</a:t>
-            </a:r>
-            <a:r>
-              <a:rPr lang="es-ES" sz="900" dirty="0">
-                <a:solidFill>
-                  <a:schemeClr val="tx1"/>
-                </a:solidFill>
-                <a:latin typeface="Arial" panose="020B0604020202020204" pitchFamily="34" charset="0"/>
-                <a:cs typeface="Arial" panose="020B0604020202020204" pitchFamily="34" charset="0"/>
-              </a:rPr>
               <a:t>)</a:t>
             </a:r>
-            <a:endParaRPr lang="es-ES" sz="900" dirty="0">
-              <a:solidFill>
-                <a:schemeClr val="tx1"/>
-              </a:solidFill>
-              <a:latin typeface="Arial" panose="020B0604020202020204" pitchFamily="34" charset="0"/>
-              <a:cs typeface="Arial" panose="020B0604020202020204" pitchFamily="34" charset="0"/>
-            </a:endParaRPr>
           </a:p>
         </p:txBody>
       </p:sp>

</xml_diff>